<commit_message>
Update a few more diagrams
</commit_message>
<xml_diff>
--- a/docs/diagrams/LogicComponentCommandClassDiagram.pptx
+++ b/docs/diagrams/LogicComponentCommandClassDiagram.pptx
@@ -212,7 +212,7 @@
           <a:p>
             <a:fld id="{F5CC4B3F-88C1-4FFA-B1B6-F41C21DC6924}" type="datetimeFigureOut">
               <a:rPr lang="en-US" smtClean="0"/>
-              <a:t>7/21/17</a:t>
+              <a:t>10/18/2017</a:t>
             </a:fld>
             <a:endParaRPr lang="en-US"/>
           </a:p>
@@ -658,7 +658,7 @@
           <a:p>
             <a:fld id="{78C97017-6FC3-485B-9764-EAC9E56C1D49}" type="datetimeFigureOut">
               <a:rPr lang="en-US" smtClean="0"/>
-              <a:t>7/21/17</a:t>
+              <a:t>10/18/2017</a:t>
             </a:fld>
             <a:endParaRPr lang="en-US"/>
           </a:p>
@@ -826,7 +826,7 @@
           <a:p>
             <a:fld id="{78C97017-6FC3-485B-9764-EAC9E56C1D49}" type="datetimeFigureOut">
               <a:rPr lang="en-US" smtClean="0"/>
-              <a:t>7/21/17</a:t>
+              <a:t>10/18/2017</a:t>
             </a:fld>
             <a:endParaRPr lang="en-US"/>
           </a:p>
@@ -1004,7 +1004,7 @@
           <a:p>
             <a:fld id="{78C97017-6FC3-485B-9764-EAC9E56C1D49}" type="datetimeFigureOut">
               <a:rPr lang="en-US" smtClean="0"/>
-              <a:t>7/21/17</a:t>
+              <a:t>10/18/2017</a:t>
             </a:fld>
             <a:endParaRPr lang="en-US"/>
           </a:p>
@@ -1172,7 +1172,7 @@
           <a:p>
             <a:fld id="{78C97017-6FC3-485B-9764-EAC9E56C1D49}" type="datetimeFigureOut">
               <a:rPr lang="en-US" smtClean="0"/>
-              <a:t>7/21/17</a:t>
+              <a:t>10/18/2017</a:t>
             </a:fld>
             <a:endParaRPr lang="en-US"/>
           </a:p>
@@ -1417,7 +1417,7 @@
           <a:p>
             <a:fld id="{78C97017-6FC3-485B-9764-EAC9E56C1D49}" type="datetimeFigureOut">
               <a:rPr lang="en-US" smtClean="0"/>
-              <a:t>7/21/17</a:t>
+              <a:t>10/18/2017</a:t>
             </a:fld>
             <a:endParaRPr lang="en-US"/>
           </a:p>
@@ -1702,7 +1702,7 @@
           <a:p>
             <a:fld id="{78C97017-6FC3-485B-9764-EAC9E56C1D49}" type="datetimeFigureOut">
               <a:rPr lang="en-US" smtClean="0"/>
-              <a:t>7/21/17</a:t>
+              <a:t>10/18/2017</a:t>
             </a:fld>
             <a:endParaRPr lang="en-US"/>
           </a:p>
@@ -2121,7 +2121,7 @@
           <a:p>
             <a:fld id="{78C97017-6FC3-485B-9764-EAC9E56C1D49}" type="datetimeFigureOut">
               <a:rPr lang="en-US" smtClean="0"/>
-              <a:t>7/21/17</a:t>
+              <a:t>10/18/2017</a:t>
             </a:fld>
             <a:endParaRPr lang="en-US"/>
           </a:p>
@@ -2238,7 +2238,7 @@
           <a:p>
             <a:fld id="{78C97017-6FC3-485B-9764-EAC9E56C1D49}" type="datetimeFigureOut">
               <a:rPr lang="en-US" smtClean="0"/>
-              <a:t>7/21/17</a:t>
+              <a:t>10/18/2017</a:t>
             </a:fld>
             <a:endParaRPr lang="en-US"/>
           </a:p>
@@ -2333,7 +2333,7 @@
           <a:p>
             <a:fld id="{78C97017-6FC3-485B-9764-EAC9E56C1D49}" type="datetimeFigureOut">
               <a:rPr lang="en-US" smtClean="0"/>
-              <a:t>7/21/17</a:t>
+              <a:t>10/18/2017</a:t>
             </a:fld>
             <a:endParaRPr lang="en-US"/>
           </a:p>
@@ -2608,7 +2608,7 @@
           <a:p>
             <a:fld id="{78C97017-6FC3-485B-9764-EAC9E56C1D49}" type="datetimeFigureOut">
               <a:rPr lang="en-US" smtClean="0"/>
-              <a:t>7/21/17</a:t>
+              <a:t>10/18/2017</a:t>
             </a:fld>
             <a:endParaRPr lang="en-US"/>
           </a:p>
@@ -2860,7 +2860,7 @@
           <a:p>
             <a:fld id="{78C97017-6FC3-485B-9764-EAC9E56C1D49}" type="datetimeFigureOut">
               <a:rPr lang="en-US" smtClean="0"/>
-              <a:t>7/21/17</a:t>
+              <a:t>10/18/2017</a:t>
             </a:fld>
             <a:endParaRPr lang="en-US"/>
           </a:p>
@@ -3071,7 +3071,7 @@
           <a:p>
             <a:fld id="{78C97017-6FC3-485B-9764-EAC9E56C1D49}" type="datetimeFigureOut">
               <a:rPr lang="en-US" smtClean="0"/>
-              <a:t>7/21/17</a:t>
+              <a:t>10/18/2017</a:t>
             </a:fld>
             <a:endParaRPr lang="en-US"/>
           </a:p>
@@ -3454,7 +3454,7 @@
         </p:nvSpPr>
         <p:spPr>
           <a:xfrm>
-            <a:off x="831983" y="1961662"/>
+            <a:off x="146183" y="1961662"/>
             <a:ext cx="1311779" cy="2076938"/>
           </a:xfrm>
           <a:prstGeom prst="roundRect">
@@ -3507,8 +3507,8 @@
         </p:nvSpPr>
         <p:spPr>
           <a:xfrm>
-            <a:off x="3124200" y="1600200"/>
-            <a:ext cx="5486400" cy="2819400"/>
+            <a:off x="2438400" y="990600"/>
+            <a:ext cx="6172200" cy="4038600"/>
           </a:xfrm>
           <a:prstGeom prst="roundRect">
             <a:avLst>
@@ -3568,7 +3568,7 @@
         </p:nvSpPr>
         <p:spPr>
           <a:xfrm>
-            <a:off x="5410201" y="1826345"/>
+            <a:off x="4724401" y="1826345"/>
             <a:ext cx="772043" cy="346760"/>
           </a:xfrm>
           <a:prstGeom prst="rect">
@@ -3642,7 +3642,7 @@
         </p:nvCxnSpPr>
         <p:spPr>
           <a:xfrm rot="10800000" flipV="1">
-            <a:off x="4504529" y="1999724"/>
+            <a:off x="3818729" y="1999724"/>
             <a:ext cx="905672" cy="668879"/>
           </a:xfrm>
           <a:prstGeom prst="bentConnector3">
@@ -3678,7 +3678,7 @@
         </p:nvSpPr>
         <p:spPr>
           <a:xfrm>
-            <a:off x="5410200" y="2514600"/>
+            <a:off x="4724400" y="2514600"/>
             <a:ext cx="772043" cy="509659"/>
           </a:xfrm>
           <a:prstGeom prst="rect">
@@ -3718,14 +3718,6 @@
               </a:rPr>
               <a:t>{abstract}</a:t>
             </a:r>
-            <a:r>
-              <a:rPr lang="en-US" sz="1050" b="1">
-                <a:solidFill>
-                  <a:srgbClr val="0070C0"/>
-                </a:solidFill>
-              </a:rPr>
-              <a:t/>
-            </a:r>
             <a:br>
               <a:rPr lang="en-US" sz="1050" b="1">
                 <a:solidFill>
@@ -3734,7 +3726,7 @@
               </a:rPr>
             </a:br>
             <a:r>
-              <a:rPr lang="en-US" sz="1050" b="1" smtClean="0">
+              <a:rPr lang="en-US" sz="1050" b="1">
                 <a:solidFill>
                   <a:srgbClr val="0070C0"/>
                 </a:solidFill>
@@ -3745,7 +3737,7 @@
           <a:p>
             <a:pPr algn="ctr"/>
             <a:r>
-              <a:rPr lang="en-US" sz="1050" b="1" dirty="0" smtClean="0">
+              <a:rPr lang="en-US" sz="1050" b="1" dirty="0">
                 <a:solidFill>
                   <a:srgbClr val="0070C0"/>
                 </a:solidFill>
@@ -3771,7 +3763,7 @@
         </p:nvCxnSpPr>
         <p:spPr>
           <a:xfrm rot="5400000">
-            <a:off x="5625476" y="2343852"/>
+            <a:off x="4939676" y="2343852"/>
             <a:ext cx="341495" cy="1"/>
           </a:xfrm>
           <a:prstGeom prst="bentConnector3">
@@ -3807,7 +3799,7 @@
         </p:nvSpPr>
         <p:spPr>
           <a:xfrm rot="10800000" flipV="1">
-            <a:off x="5660969" y="2173104"/>
+            <a:off x="4975169" y="2173104"/>
             <a:ext cx="270504" cy="175523"/>
           </a:xfrm>
           <a:prstGeom prst="triangle">
@@ -3861,7 +3853,7 @@
         </p:nvSpPr>
         <p:spPr>
           <a:xfrm flipH="1">
-            <a:off x="7239001" y="2997128"/>
+            <a:off x="6553200" y="2962981"/>
             <a:ext cx="1175193" cy="359669"/>
           </a:xfrm>
           <a:prstGeom prst="rect">
@@ -3894,7 +3886,7 @@
           <a:p>
             <a:pPr algn="ctr"/>
             <a:r>
-              <a:rPr lang="en-US" sz="1050" b="1" smtClean="0">
+              <a:rPr lang="en-US" sz="1050" b="1">
                 <a:solidFill>
                   <a:srgbClr val="0070C0"/>
                 </a:solidFill>
@@ -3917,7 +3909,7 @@
         </p:nvSpPr>
         <p:spPr>
           <a:xfrm flipH="1">
-            <a:off x="7239000" y="3431436"/>
+            <a:off x="6553200" y="3431436"/>
             <a:ext cx="1175194" cy="359669"/>
           </a:xfrm>
           <a:prstGeom prst="rect">
@@ -3950,7 +3942,7 @@
           <a:p>
             <a:pPr algn="ctr"/>
             <a:r>
-              <a:rPr lang="en-US" sz="1050" b="1" dirty="0" err="1" smtClean="0">
+              <a:rPr lang="en-US" sz="1050" b="1" dirty="0" err="1">
                 <a:solidFill>
                   <a:srgbClr val="0070C0"/>
                 </a:solidFill>
@@ -3973,7 +3965,7 @@
         </p:nvSpPr>
         <p:spPr>
           <a:xfrm flipH="1">
-            <a:off x="7239000" y="3906103"/>
+            <a:off x="6553200" y="3906103"/>
             <a:ext cx="1175194" cy="359669"/>
           </a:xfrm>
           <a:prstGeom prst="rect">
@@ -4006,7 +3998,7 @@
           <a:p>
             <a:pPr algn="ctr"/>
             <a:r>
-              <a:rPr lang="mr-IN" sz="1050" b="1" dirty="0" smtClean="0">
+              <a:rPr lang="mr-IN" sz="1050" b="1" dirty="0">
                 <a:solidFill>
                   <a:srgbClr val="0070C0"/>
                 </a:solidFill>
@@ -4032,7 +4024,7 @@
         </p:nvCxnSpPr>
         <p:spPr>
           <a:xfrm>
-            <a:off x="6182243" y="2769430"/>
+            <a:off x="5496443" y="2769430"/>
             <a:ext cx="1056757" cy="1316508"/>
           </a:xfrm>
           <a:prstGeom prst="bentConnector3">
@@ -4071,7 +4063,7 @@
         </p:nvCxnSpPr>
         <p:spPr>
           <a:xfrm>
-            <a:off x="6182243" y="2769430"/>
+            <a:off x="5496443" y="2769430"/>
             <a:ext cx="1056757" cy="841841"/>
           </a:xfrm>
           <a:prstGeom prst="bentConnector3">
@@ -4110,8 +4102,8 @@
         </p:nvCxnSpPr>
         <p:spPr>
           <a:xfrm>
-            <a:off x="6182243" y="2769430"/>
-            <a:ext cx="1056758" cy="407533"/>
+            <a:off x="5496443" y="2769430"/>
+            <a:ext cx="1056757" cy="373386"/>
           </a:xfrm>
           <a:prstGeom prst="bentConnector3">
             <a:avLst>
@@ -4146,7 +4138,7 @@
         </p:nvSpPr>
         <p:spPr>
           <a:xfrm rot="5400000" flipV="1">
-            <a:off x="6134752" y="2691099"/>
+            <a:off x="5448952" y="2691099"/>
             <a:ext cx="270504" cy="175523"/>
           </a:xfrm>
           <a:prstGeom prst="triangle">
@@ -4200,7 +4192,7 @@
         </p:nvSpPr>
         <p:spPr>
           <a:xfrm flipH="1">
-            <a:off x="3329336" y="2488769"/>
+            <a:off x="2643536" y="2488769"/>
             <a:ext cx="1175193" cy="359669"/>
           </a:xfrm>
           <a:prstGeom prst="rect">
@@ -4233,7 +4225,7 @@
           <a:p>
             <a:pPr algn="ctr"/>
             <a:r>
-              <a:rPr lang="en-US" sz="1050" b="1" smtClean="0">
+              <a:rPr lang="en-US" sz="1050" b="1">
                 <a:solidFill>
                   <a:srgbClr val="0070C0"/>
                 </a:solidFill>
@@ -4256,7 +4248,7 @@
         </p:nvSpPr>
         <p:spPr>
           <a:xfrm flipH="1">
-            <a:off x="3329336" y="2944348"/>
+            <a:off x="2643536" y="2944348"/>
             <a:ext cx="1175193" cy="359669"/>
           </a:xfrm>
           <a:prstGeom prst="rect">
@@ -4289,7 +4281,7 @@
           <a:p>
             <a:pPr algn="ctr"/>
             <a:r>
-              <a:rPr lang="en-US" sz="1050" b="1" dirty="0" err="1" smtClean="0">
+              <a:rPr lang="en-US" sz="1050" b="1" dirty="0" err="1">
                 <a:solidFill>
                   <a:srgbClr val="0070C0"/>
                 </a:solidFill>
@@ -4315,7 +4307,7 @@
         </p:nvCxnSpPr>
         <p:spPr>
           <a:xfrm rot="10800000" flipV="1">
-            <a:off x="4504529" y="1999725"/>
+            <a:off x="3818729" y="1999725"/>
             <a:ext cx="905672" cy="1124458"/>
           </a:xfrm>
           <a:prstGeom prst="bentConnector3">
@@ -4351,7 +4343,7 @@
         </p:nvSpPr>
         <p:spPr>
           <a:xfrm flipH="1">
-            <a:off x="3328030" y="3396703"/>
+            <a:off x="2642230" y="3396703"/>
             <a:ext cx="1175194" cy="359669"/>
           </a:xfrm>
           <a:prstGeom prst="rect">
@@ -4384,7 +4376,7 @@
           <a:p>
             <a:pPr algn="ctr"/>
             <a:r>
-              <a:rPr lang="mr-IN" sz="1050" b="1" dirty="0" smtClean="0">
+              <a:rPr lang="mr-IN" sz="1050" b="1" dirty="0">
                 <a:solidFill>
                   <a:srgbClr val="0070C0"/>
                 </a:solidFill>
@@ -4410,7 +4402,7 @@
         </p:nvCxnSpPr>
         <p:spPr>
           <a:xfrm rot="10800000" flipV="1">
-            <a:off x="4503225" y="1999724"/>
+            <a:off x="3817425" y="1999724"/>
             <a:ext cx="906977" cy="1576813"/>
           </a:xfrm>
           <a:prstGeom prst="bentConnector3">
@@ -4446,7 +4438,7 @@
         </p:nvSpPr>
         <p:spPr>
           <a:xfrm rot="16200000" flipV="1">
-            <a:off x="5187187" y="1911963"/>
+            <a:off x="4501387" y="1911963"/>
             <a:ext cx="270504" cy="175523"/>
           </a:xfrm>
           <a:prstGeom prst="triangle">
@@ -4500,7 +4492,7 @@
         </p:nvSpPr>
         <p:spPr>
           <a:xfrm flipH="1">
-            <a:off x="1003252" y="2120502"/>
+            <a:off x="317452" y="2120502"/>
             <a:ext cx="970326" cy="346760"/>
           </a:xfrm>
           <a:prstGeom prst="rect">
@@ -4533,7 +4525,7 @@
           <a:p>
             <a:pPr algn="ctr"/>
             <a:r>
-              <a:rPr lang="en-US" sz="1050" b="1" dirty="0" err="1" smtClean="0">
+              <a:rPr lang="en-US" sz="1050" b="1" dirty="0" err="1">
                 <a:solidFill>
                   <a:srgbClr val="0070C0"/>
                 </a:solidFill>
@@ -4556,7 +4548,7 @@
         </p:nvSpPr>
         <p:spPr>
           <a:xfrm>
-            <a:off x="1101850" y="3529390"/>
+            <a:off x="416050" y="3529390"/>
             <a:ext cx="772043" cy="346760"/>
           </a:xfrm>
           <a:prstGeom prst="rect">
@@ -4627,7 +4619,7 @@
         </p:nvSpPr>
         <p:spPr>
           <a:xfrm flipV="1">
-            <a:off x="1352621" y="3360825"/>
+            <a:off x="666821" y="3360825"/>
             <a:ext cx="270504" cy="175523"/>
           </a:xfrm>
           <a:prstGeom prst="triangle">
@@ -4683,7 +4675,7 @@
         </p:nvCxnSpPr>
         <p:spPr>
           <a:xfrm rot="5400000" flipH="1" flipV="1">
-            <a:off x="1041363" y="2913773"/>
+            <a:off x="355563" y="2913773"/>
             <a:ext cx="893563" cy="542"/>
           </a:xfrm>
           <a:prstGeom prst="bentConnector3">
@@ -4715,6 +4707,7 @@
         <p:nvCxnSpPr>
           <p:cNvPr id="30" name="Elbow Connector 25"/>
           <p:cNvCxnSpPr>
+            <a:cxnSpLocks/>
             <a:stCxn id="2" idx="1"/>
             <a:endCxn id="25" idx="3"/>
           </p:cNvCxnSpPr>
@@ -4722,7 +4715,7 @@
         </p:nvCxnSpPr>
         <p:spPr>
           <a:xfrm flipH="1" flipV="1">
-            <a:off x="2143762" y="3000131"/>
+            <a:off x="1457962" y="3000131"/>
             <a:ext cx="980438" cy="9769"/>
           </a:xfrm>
           <a:prstGeom prst="straightConnector1">
@@ -4751,6 +4744,484 @@
           </a:fontRef>
         </p:style>
       </p:cxnSp>
+      <p:sp>
+        <p:nvSpPr>
+          <p:cNvPr id="32" name="Rectangle 11">
+            <a:extLst>
+              <a:ext uri="{FF2B5EF4-FFF2-40B4-BE49-F238E27FC236}">
+                <a16:creationId xmlns:a16="http://schemas.microsoft.com/office/drawing/2014/main" id="{1F48AA48-E196-4523-80F5-B6D8A6EC852B}"/>
+              </a:ext>
+            </a:extLst>
+          </p:cNvPr>
+          <p:cNvSpPr/>
+          <p:nvPr/>
+        </p:nvSpPr>
+        <p:spPr>
+          <a:xfrm flipH="1">
+            <a:off x="6553200" y="4377734"/>
+            <a:ext cx="1175194" cy="543912"/>
+          </a:xfrm>
+          <a:prstGeom prst="rect">
+            <a:avLst/>
+          </a:prstGeom>
+          <a:ln w="19050">
+            <a:solidFill>
+              <a:srgbClr val="0070C0"/>
+            </a:solidFill>
+          </a:ln>
+          <a:effectLst/>
+        </p:spPr>
+        <p:style>
+          <a:lnRef idx="1">
+            <a:schemeClr val="accent1"/>
+          </a:lnRef>
+          <a:fillRef idx="2">
+            <a:schemeClr val="accent1"/>
+          </a:fillRef>
+          <a:effectRef idx="1">
+            <a:schemeClr val="accent1"/>
+          </a:effectRef>
+          <a:fontRef idx="minor">
+            <a:schemeClr val="dk1"/>
+          </a:fontRef>
+        </p:style>
+        <p:txBody>
+          <a:bodyPr rtlCol="0" anchor="ctr"/>
+          <a:lstStyle/>
+          <a:p>
+            <a:pPr algn="ctr"/>
+            <a:r>
+              <a:rPr lang="en-US" sz="1050" b="1" dirty="0">
+                <a:solidFill>
+                  <a:srgbClr val="0070C0"/>
+                </a:solidFill>
+              </a:rPr>
+              <a:t>{Abstract}</a:t>
+            </a:r>
+          </a:p>
+          <a:p>
+            <a:pPr algn="ctr"/>
+            <a:r>
+              <a:rPr lang="en-US" sz="1050" b="1" dirty="0" err="1">
+                <a:solidFill>
+                  <a:srgbClr val="0070C0"/>
+                </a:solidFill>
+              </a:rPr>
+              <a:t>C</a:t>
+            </a:r>
+            <a:r>
+              <a:rPr lang="en-US" altLang="zh-CN" sz="1050" b="1" dirty="0" err="1">
+                <a:solidFill>
+                  <a:srgbClr val="0070C0"/>
+                </a:solidFill>
+              </a:rPr>
+              <a:t>onfig</a:t>
+            </a:r>
+            <a:r>
+              <a:rPr lang="en-US" sz="1050" b="1" dirty="0" err="1">
+                <a:solidFill>
+                  <a:srgbClr val="0070C0"/>
+                </a:solidFill>
+              </a:rPr>
+              <a:t>Command</a:t>
+            </a:r>
+            <a:endParaRPr lang="en-US" sz="1050" b="1" dirty="0">
+              <a:solidFill>
+                <a:srgbClr val="0070C0"/>
+              </a:solidFill>
+            </a:endParaRPr>
+          </a:p>
+        </p:txBody>
+      </p:sp>
+      <p:cxnSp>
+        <p:nvCxnSpPr>
+          <p:cNvPr id="36" name="Elbow Connector 128">
+            <a:extLst>
+              <a:ext uri="{FF2B5EF4-FFF2-40B4-BE49-F238E27FC236}">
+                <a16:creationId xmlns:a16="http://schemas.microsoft.com/office/drawing/2014/main" id="{A1469089-291A-465A-8F00-F6E53173534C}"/>
+              </a:ext>
+            </a:extLst>
+          </p:cNvPr>
+          <p:cNvCxnSpPr>
+            <a:cxnSpLocks/>
+            <a:endCxn id="32" idx="3"/>
+          </p:cNvCxnSpPr>
+          <p:nvPr/>
+        </p:nvCxnSpPr>
+        <p:spPr>
+          <a:xfrm rot="16200000" flipH="1">
+            <a:off x="5358230" y="3454720"/>
+            <a:ext cx="1861560" cy="528379"/>
+          </a:xfrm>
+          <a:prstGeom prst="bentConnector2">
+            <a:avLst/>
+          </a:prstGeom>
+          <a:ln w="19050">
+            <a:headEnd type="none" w="med" len="med"/>
+            <a:tailEnd type="none" w="med" len="med"/>
+          </a:ln>
+        </p:spPr>
+        <p:style>
+          <a:lnRef idx="1">
+            <a:schemeClr val="accent1"/>
+          </a:lnRef>
+          <a:fillRef idx="0">
+            <a:schemeClr val="accent1"/>
+          </a:fillRef>
+          <a:effectRef idx="0">
+            <a:schemeClr val="accent1"/>
+          </a:effectRef>
+          <a:fontRef idx="minor">
+            <a:schemeClr val="tx1"/>
+          </a:fontRef>
+        </p:style>
+      </p:cxnSp>
+      <p:sp>
+        <p:nvSpPr>
+          <p:cNvPr id="44" name="Rectangle 65">
+            <a:extLst>
+              <a:ext uri="{FF2B5EF4-FFF2-40B4-BE49-F238E27FC236}">
+                <a16:creationId xmlns:a16="http://schemas.microsoft.com/office/drawing/2014/main" id="{D79C4888-0288-422D-A15E-4D68D3677602}"/>
+              </a:ext>
+            </a:extLst>
+          </p:cNvPr>
+          <p:cNvSpPr/>
+          <p:nvPr/>
+        </p:nvSpPr>
+        <p:spPr>
+          <a:xfrm>
+            <a:off x="2895601" y="5491019"/>
+            <a:ext cx="1918497" cy="1097690"/>
+          </a:xfrm>
+          <a:prstGeom prst="roundRect">
+            <a:avLst>
+              <a:gd name="adj" fmla="val 3484"/>
+            </a:avLst>
+          </a:prstGeom>
+          <a:solidFill>
+            <a:schemeClr val="accent1">
+              <a:lumMod val="20000"/>
+              <a:lumOff val="80000"/>
+            </a:schemeClr>
+          </a:solidFill>
+          <a:ln w="19050">
+            <a:noFill/>
+          </a:ln>
+          <a:effectLst/>
+        </p:spPr>
+        <p:style>
+          <a:lnRef idx="1">
+            <a:schemeClr val="accent2"/>
+          </a:lnRef>
+          <a:fillRef idx="2">
+            <a:schemeClr val="accent2"/>
+          </a:fillRef>
+          <a:effectRef idx="1">
+            <a:schemeClr val="accent2"/>
+          </a:effectRef>
+          <a:fontRef idx="minor">
+            <a:schemeClr val="dk1"/>
+          </a:fontRef>
+        </p:style>
+        <p:txBody>
+          <a:bodyPr rtlCol="0" anchor="t"/>
+          <a:lstStyle/>
+          <a:p>
+            <a:endParaRPr lang="en-SG" sz="1200" b="1" dirty="0">
+              <a:solidFill>
+                <a:srgbClr val="0070C0"/>
+              </a:solidFill>
+            </a:endParaRPr>
+          </a:p>
+        </p:txBody>
+      </p:sp>
+      <p:sp>
+        <p:nvSpPr>
+          <p:cNvPr id="45" name="Rectangle 11">
+            <a:extLst>
+              <a:ext uri="{FF2B5EF4-FFF2-40B4-BE49-F238E27FC236}">
+                <a16:creationId xmlns:a16="http://schemas.microsoft.com/office/drawing/2014/main" id="{0218D461-A9A1-4750-A4A9-3E72A22E9018}"/>
+              </a:ext>
+            </a:extLst>
+          </p:cNvPr>
+          <p:cNvSpPr/>
+          <p:nvPr/>
+        </p:nvSpPr>
+        <p:spPr>
+          <a:xfrm flipH="1">
+            <a:off x="3048000" y="5600772"/>
+            <a:ext cx="1500877" cy="359669"/>
+          </a:xfrm>
+          <a:prstGeom prst="rect">
+            <a:avLst/>
+          </a:prstGeom>
+          <a:ln w="19050">
+            <a:solidFill>
+              <a:srgbClr val="0070C0"/>
+            </a:solidFill>
+          </a:ln>
+          <a:effectLst/>
+        </p:spPr>
+        <p:style>
+          <a:lnRef idx="1">
+            <a:schemeClr val="accent1"/>
+          </a:lnRef>
+          <a:fillRef idx="2">
+            <a:schemeClr val="accent1"/>
+          </a:fillRef>
+          <a:effectRef idx="1">
+            <a:schemeClr val="accent1"/>
+          </a:effectRef>
+          <a:fontRef idx="minor">
+            <a:schemeClr val="dk1"/>
+          </a:fontRef>
+        </p:style>
+        <p:txBody>
+          <a:bodyPr rtlCol="0" anchor="ctr"/>
+          <a:lstStyle/>
+          <a:p>
+            <a:pPr algn="ctr"/>
+            <a:r>
+              <a:rPr lang="en-US" sz="1050" b="1" dirty="0" err="1">
+                <a:solidFill>
+                  <a:srgbClr val="0070C0"/>
+                </a:solidFill>
+              </a:rPr>
+              <a:t>AddP</a:t>
+            </a:r>
+            <a:r>
+              <a:rPr lang="en-US" altLang="zh-CN" sz="1050" b="1" dirty="0" err="1">
+                <a:solidFill>
+                  <a:srgbClr val="0070C0"/>
+                </a:solidFill>
+              </a:rPr>
+              <a:t>roperty</a:t>
+            </a:r>
+            <a:r>
+              <a:rPr lang="en-US" sz="1050" b="1" dirty="0" err="1">
+                <a:solidFill>
+                  <a:srgbClr val="0070C0"/>
+                </a:solidFill>
+              </a:rPr>
+              <a:t>Command</a:t>
+            </a:r>
+            <a:endParaRPr lang="en-US" sz="1050" b="1" dirty="0">
+              <a:solidFill>
+                <a:srgbClr val="0070C0"/>
+              </a:solidFill>
+            </a:endParaRPr>
+          </a:p>
+        </p:txBody>
+      </p:sp>
+      <p:sp>
+        <p:nvSpPr>
+          <p:cNvPr id="47" name="Rectangle 11">
+            <a:extLst>
+              <a:ext uri="{FF2B5EF4-FFF2-40B4-BE49-F238E27FC236}">
+                <a16:creationId xmlns:a16="http://schemas.microsoft.com/office/drawing/2014/main" id="{687798E8-44A2-48D8-BC3A-C913056D3845}"/>
+              </a:ext>
+            </a:extLst>
+          </p:cNvPr>
+          <p:cNvSpPr/>
+          <p:nvPr/>
+        </p:nvSpPr>
+        <p:spPr>
+          <a:xfrm flipH="1">
+            <a:off x="3047999" y="6098854"/>
+            <a:ext cx="1500877" cy="359669"/>
+          </a:xfrm>
+          <a:prstGeom prst="rect">
+            <a:avLst/>
+          </a:prstGeom>
+          <a:ln w="19050">
+            <a:solidFill>
+              <a:srgbClr val="0070C0"/>
+            </a:solidFill>
+          </a:ln>
+          <a:effectLst/>
+        </p:spPr>
+        <p:style>
+          <a:lnRef idx="1">
+            <a:schemeClr val="accent1"/>
+          </a:lnRef>
+          <a:fillRef idx="2">
+            <a:schemeClr val="accent1"/>
+          </a:fillRef>
+          <a:effectRef idx="1">
+            <a:schemeClr val="accent1"/>
+          </a:effectRef>
+          <a:fontRef idx="minor">
+            <a:schemeClr val="dk1"/>
+          </a:fontRef>
+        </p:style>
+        <p:txBody>
+          <a:bodyPr rtlCol="0" anchor="ctr"/>
+          <a:lstStyle/>
+          <a:p>
+            <a:pPr algn="ctr"/>
+            <a:r>
+              <a:rPr lang="mr-IN" sz="1050" b="1" dirty="0">
+                <a:solidFill>
+                  <a:srgbClr val="0070C0"/>
+                </a:solidFill>
+              </a:rPr>
+              <a:t>…</a:t>
+            </a:r>
+            <a:endParaRPr lang="en-US" sz="1050" b="1" dirty="0">
+              <a:solidFill>
+                <a:srgbClr val="0070C0"/>
+              </a:solidFill>
+            </a:endParaRPr>
+          </a:p>
+        </p:txBody>
+      </p:sp>
+      <p:cxnSp>
+        <p:nvCxnSpPr>
+          <p:cNvPr id="48" name="Elbow Connector 128">
+            <a:extLst>
+              <a:ext uri="{FF2B5EF4-FFF2-40B4-BE49-F238E27FC236}">
+                <a16:creationId xmlns:a16="http://schemas.microsoft.com/office/drawing/2014/main" id="{FB6FC0D4-86FF-401A-8116-B385E9919C2F}"/>
+              </a:ext>
+            </a:extLst>
+          </p:cNvPr>
+          <p:cNvCxnSpPr>
+            <a:cxnSpLocks/>
+            <a:stCxn id="45" idx="1"/>
+          </p:cNvCxnSpPr>
+          <p:nvPr/>
+        </p:nvCxnSpPr>
+        <p:spPr>
+          <a:xfrm flipV="1">
+            <a:off x="4548877" y="5096565"/>
+            <a:ext cx="2591921" cy="684042"/>
+          </a:xfrm>
+          <a:prstGeom prst="bentConnector2">
+            <a:avLst/>
+          </a:prstGeom>
+          <a:ln w="19050">
+            <a:headEnd type="none" w="med" len="med"/>
+            <a:tailEnd type="none" w="med" len="med"/>
+          </a:ln>
+        </p:spPr>
+        <p:style>
+          <a:lnRef idx="1">
+            <a:schemeClr val="accent1"/>
+          </a:lnRef>
+          <a:fillRef idx="0">
+            <a:schemeClr val="accent1"/>
+          </a:fillRef>
+          <a:effectRef idx="0">
+            <a:schemeClr val="accent1"/>
+          </a:effectRef>
+          <a:fontRef idx="minor">
+            <a:schemeClr val="tx1"/>
+          </a:fontRef>
+        </p:style>
+      </p:cxnSp>
+      <p:cxnSp>
+        <p:nvCxnSpPr>
+          <p:cNvPr id="51" name="Elbow Connector 128">
+            <a:extLst>
+              <a:ext uri="{FF2B5EF4-FFF2-40B4-BE49-F238E27FC236}">
+                <a16:creationId xmlns:a16="http://schemas.microsoft.com/office/drawing/2014/main" id="{ABD1A70F-F311-43D9-BFA6-3D7DBBB44507}"/>
+              </a:ext>
+            </a:extLst>
+          </p:cNvPr>
+          <p:cNvCxnSpPr>
+            <a:cxnSpLocks/>
+            <a:stCxn id="47" idx="1"/>
+            <a:endCxn id="54" idx="3"/>
+          </p:cNvCxnSpPr>
+          <p:nvPr/>
+        </p:nvCxnSpPr>
+        <p:spPr>
+          <a:xfrm flipV="1">
+            <a:off x="4548876" y="5102071"/>
+            <a:ext cx="2595932" cy="1176618"/>
+          </a:xfrm>
+          <a:prstGeom prst="bentConnector2">
+            <a:avLst/>
+          </a:prstGeom>
+          <a:ln w="19050">
+            <a:headEnd type="none" w="med" len="med"/>
+            <a:tailEnd type="none" w="med" len="med"/>
+          </a:ln>
+        </p:spPr>
+        <p:style>
+          <a:lnRef idx="1">
+            <a:schemeClr val="accent1"/>
+          </a:lnRef>
+          <a:fillRef idx="0">
+            <a:schemeClr val="accent1"/>
+          </a:fillRef>
+          <a:effectRef idx="0">
+            <a:schemeClr val="accent1"/>
+          </a:effectRef>
+          <a:fontRef idx="minor">
+            <a:schemeClr val="tx1"/>
+          </a:fontRef>
+        </p:style>
+      </p:cxnSp>
+      <p:sp>
+        <p:nvSpPr>
+          <p:cNvPr id="54" name="Isosceles Triangle 102">
+            <a:extLst>
+              <a:ext uri="{FF2B5EF4-FFF2-40B4-BE49-F238E27FC236}">
+                <a16:creationId xmlns:a16="http://schemas.microsoft.com/office/drawing/2014/main" id="{1F5E1BBE-4C54-432A-9D8D-2C6A5C2ED16F}"/>
+              </a:ext>
+            </a:extLst>
+          </p:cNvPr>
+          <p:cNvSpPr/>
+          <p:nvPr/>
+        </p:nvSpPr>
+        <p:spPr>
+          <a:xfrm rot="10800000" flipV="1">
+            <a:off x="7009556" y="4926548"/>
+            <a:ext cx="270504" cy="175523"/>
+          </a:xfrm>
+          <a:prstGeom prst="triangle">
+            <a:avLst/>
+          </a:prstGeom>
+          <a:solidFill>
+            <a:schemeClr val="tx2">
+              <a:lumMod val="60000"/>
+              <a:lumOff val="40000"/>
+            </a:schemeClr>
+          </a:solidFill>
+          <a:ln w="19050">
+            <a:solidFill>
+              <a:srgbClr val="0070C0"/>
+            </a:solidFill>
+          </a:ln>
+          <a:effectLst/>
+        </p:spPr>
+        <p:style>
+          <a:lnRef idx="1">
+            <a:schemeClr val="accent1"/>
+          </a:lnRef>
+          <a:fillRef idx="2">
+            <a:schemeClr val="accent1"/>
+          </a:fillRef>
+          <a:effectRef idx="1">
+            <a:schemeClr val="accent1"/>
+          </a:effectRef>
+          <a:fontRef idx="minor">
+            <a:schemeClr val="dk1"/>
+          </a:fontRef>
+        </p:style>
+        <p:txBody>
+          <a:bodyPr rtlCol="0" anchor="ctr"/>
+          <a:lstStyle/>
+          <a:p>
+            <a:pPr algn="ctr"/>
+            <a:endParaRPr lang="en-SG" sz="1050" b="1">
+              <a:solidFill>
+                <a:srgbClr val="92D050"/>
+              </a:solidFill>
+            </a:endParaRPr>
+          </a:p>
+        </p:txBody>
+      </p:sp>
     </p:spTree>
     <p:extLst>
       <p:ext uri="{BB962C8B-B14F-4D97-AF65-F5344CB8AC3E}">

</xml_diff>

<commit_message>
edited logic class diagram to add event commands
</commit_message>
<xml_diff>
--- a/docs/diagrams/LogicComponentCommandClassDiagram.pptx
+++ b/docs/diagrams/LogicComponentCommandClassDiagram.pptx
@@ -212,7 +212,7 @@
           <a:p>
             <a:fld id="{F5CC4B3F-88C1-4FFA-B1B6-F41C21DC6924}" type="datetimeFigureOut">
               <a:rPr lang="en-US" smtClean="0"/>
-              <a:t>10/18/2017</a:t>
+              <a:t>10/19/2017</a:t>
             </a:fld>
             <a:endParaRPr lang="en-US"/>
           </a:p>
@@ -658,7 +658,7 @@
           <a:p>
             <a:fld id="{78C97017-6FC3-485B-9764-EAC9E56C1D49}" type="datetimeFigureOut">
               <a:rPr lang="en-US" smtClean="0"/>
-              <a:t>10/18/2017</a:t>
+              <a:t>10/19/2017</a:t>
             </a:fld>
             <a:endParaRPr lang="en-US"/>
           </a:p>
@@ -826,7 +826,7 @@
           <a:p>
             <a:fld id="{78C97017-6FC3-485B-9764-EAC9E56C1D49}" type="datetimeFigureOut">
               <a:rPr lang="en-US" smtClean="0"/>
-              <a:t>10/18/2017</a:t>
+              <a:t>10/19/2017</a:t>
             </a:fld>
             <a:endParaRPr lang="en-US"/>
           </a:p>
@@ -1004,7 +1004,7 @@
           <a:p>
             <a:fld id="{78C97017-6FC3-485B-9764-EAC9E56C1D49}" type="datetimeFigureOut">
               <a:rPr lang="en-US" smtClean="0"/>
-              <a:t>10/18/2017</a:t>
+              <a:t>10/19/2017</a:t>
             </a:fld>
             <a:endParaRPr lang="en-US"/>
           </a:p>
@@ -1172,7 +1172,7 @@
           <a:p>
             <a:fld id="{78C97017-6FC3-485B-9764-EAC9E56C1D49}" type="datetimeFigureOut">
               <a:rPr lang="en-US" smtClean="0"/>
-              <a:t>10/18/2017</a:t>
+              <a:t>10/19/2017</a:t>
             </a:fld>
             <a:endParaRPr lang="en-US"/>
           </a:p>
@@ -1417,7 +1417,7 @@
           <a:p>
             <a:fld id="{78C97017-6FC3-485B-9764-EAC9E56C1D49}" type="datetimeFigureOut">
               <a:rPr lang="en-US" smtClean="0"/>
-              <a:t>10/18/2017</a:t>
+              <a:t>10/19/2017</a:t>
             </a:fld>
             <a:endParaRPr lang="en-US"/>
           </a:p>
@@ -1702,7 +1702,7 @@
           <a:p>
             <a:fld id="{78C97017-6FC3-485B-9764-EAC9E56C1D49}" type="datetimeFigureOut">
               <a:rPr lang="en-US" smtClean="0"/>
-              <a:t>10/18/2017</a:t>
+              <a:t>10/19/2017</a:t>
             </a:fld>
             <a:endParaRPr lang="en-US"/>
           </a:p>
@@ -2121,7 +2121,7 @@
           <a:p>
             <a:fld id="{78C97017-6FC3-485B-9764-EAC9E56C1D49}" type="datetimeFigureOut">
               <a:rPr lang="en-US" smtClean="0"/>
-              <a:t>10/18/2017</a:t>
+              <a:t>10/19/2017</a:t>
             </a:fld>
             <a:endParaRPr lang="en-US"/>
           </a:p>
@@ -2238,7 +2238,7 @@
           <a:p>
             <a:fld id="{78C97017-6FC3-485B-9764-EAC9E56C1D49}" type="datetimeFigureOut">
               <a:rPr lang="en-US" smtClean="0"/>
-              <a:t>10/18/2017</a:t>
+              <a:t>10/19/2017</a:t>
             </a:fld>
             <a:endParaRPr lang="en-US"/>
           </a:p>
@@ -2333,7 +2333,7 @@
           <a:p>
             <a:fld id="{78C97017-6FC3-485B-9764-EAC9E56C1D49}" type="datetimeFigureOut">
               <a:rPr lang="en-US" smtClean="0"/>
-              <a:t>10/18/2017</a:t>
+              <a:t>10/19/2017</a:t>
             </a:fld>
             <a:endParaRPr lang="en-US"/>
           </a:p>
@@ -2608,7 +2608,7 @@
           <a:p>
             <a:fld id="{78C97017-6FC3-485B-9764-EAC9E56C1D49}" type="datetimeFigureOut">
               <a:rPr lang="en-US" smtClean="0"/>
-              <a:t>10/18/2017</a:t>
+              <a:t>10/19/2017</a:t>
             </a:fld>
             <a:endParaRPr lang="en-US"/>
           </a:p>
@@ -2860,7 +2860,7 @@
           <a:p>
             <a:fld id="{78C97017-6FC3-485B-9764-EAC9E56C1D49}" type="datetimeFigureOut">
               <a:rPr lang="en-US" smtClean="0"/>
-              <a:t>10/18/2017</a:t>
+              <a:t>10/19/2017</a:t>
             </a:fld>
             <a:endParaRPr lang="en-US"/>
           </a:p>
@@ -3071,7 +3071,7 @@
           <a:p>
             <a:fld id="{78C97017-6FC3-485B-9764-EAC9E56C1D49}" type="datetimeFigureOut">
               <a:rPr lang="en-US" smtClean="0"/>
-              <a:t>10/18/2017</a:t>
+              <a:t>10/19/2017</a:t>
             </a:fld>
             <a:endParaRPr lang="en-US"/>
           </a:p>
@@ -3853,8 +3853,8 @@
         </p:nvSpPr>
         <p:spPr>
           <a:xfrm flipH="1">
-            <a:off x="6553200" y="2962981"/>
-            <a:ext cx="1175193" cy="359669"/>
+            <a:off x="6553199" y="2962981"/>
+            <a:ext cx="1295399" cy="359669"/>
           </a:xfrm>
           <a:prstGeom prst="rect">
             <a:avLst/>
@@ -3910,7 +3910,7 @@
         <p:spPr>
           <a:xfrm flipH="1">
             <a:off x="6553200" y="3431436"/>
-            <a:ext cx="1175194" cy="359669"/>
+            <a:ext cx="1295398" cy="359669"/>
           </a:xfrm>
           <a:prstGeom prst="rect">
             <a:avLst/>
@@ -3966,7 +3966,7 @@
         <p:spPr>
           <a:xfrm flipH="1">
             <a:off x="6553200" y="3906103"/>
-            <a:ext cx="1175194" cy="359669"/>
+            <a:ext cx="1295398" cy="359669"/>
           </a:xfrm>
           <a:prstGeom prst="rect">
             <a:avLst/>
@@ -4017,6 +4017,7 @@
         <p:nvCxnSpPr>
           <p:cNvPr id="129" name="Elbow Connector 128"/>
           <p:cNvCxnSpPr>
+            <a:cxnSpLocks/>
             <a:stCxn id="76" idx="3"/>
             <a:endCxn id="128" idx="3"/>
           </p:cNvCxnSpPr>
@@ -4056,6 +4057,7 @@
         <p:nvCxnSpPr>
           <p:cNvPr id="131" name="Elbow Connector 130"/>
           <p:cNvCxnSpPr>
+            <a:cxnSpLocks/>
             <a:stCxn id="76" idx="3"/>
             <a:endCxn id="113" idx="3"/>
           </p:cNvCxnSpPr>
@@ -4095,6 +4097,7 @@
         <p:nvCxnSpPr>
           <p:cNvPr id="134" name="Elbow Connector 133"/>
           <p:cNvCxnSpPr>
+            <a:cxnSpLocks/>
             <a:stCxn id="76" idx="3"/>
             <a:endCxn id="107" idx="3"/>
           </p:cNvCxnSpPr>
@@ -4103,7 +4106,7 @@
         <p:spPr>
           <a:xfrm>
             <a:off x="5496443" y="2769430"/>
-            <a:ext cx="1056757" cy="373386"/>
+            <a:ext cx="1056756" cy="373386"/>
           </a:xfrm>
           <a:prstGeom prst="bentConnector3">
             <a:avLst>
@@ -4759,7 +4762,7 @@
         <p:spPr>
           <a:xfrm flipH="1">
             <a:off x="6553200" y="4377734"/>
-            <a:ext cx="1175194" cy="543912"/>
+            <a:ext cx="1295398" cy="543912"/>
           </a:xfrm>
           <a:prstGeom prst="rect">
             <a:avLst/>
@@ -4851,7 +4854,7 @@
         <p:spPr>
           <a:xfrm rot="16200000" flipH="1">
             <a:off x="5358230" y="3454720"/>
-            <a:ext cx="1861560" cy="528379"/>
+            <a:ext cx="1861560" cy="528380"/>
           </a:xfrm>
           <a:prstGeom prst="bentConnector2">
             <a:avLst/>
@@ -5222,6 +5225,112 @@
           </a:p>
         </p:txBody>
       </p:sp>
+      <p:sp>
+        <p:nvSpPr>
+          <p:cNvPr id="35" name="Rectangle 11">
+            <a:extLst>
+              <a:ext uri="{FF2B5EF4-FFF2-40B4-BE49-F238E27FC236}">
+                <a16:creationId xmlns:a16="http://schemas.microsoft.com/office/drawing/2014/main" id="{A3D079AB-7CC4-47B0-8CB7-6B6111C28140}"/>
+              </a:ext>
+            </a:extLst>
+          </p:cNvPr>
+          <p:cNvSpPr/>
+          <p:nvPr/>
+        </p:nvSpPr>
+        <p:spPr>
+          <a:xfrm flipH="1">
+            <a:off x="6553198" y="2435163"/>
+            <a:ext cx="1295401" cy="359669"/>
+          </a:xfrm>
+          <a:prstGeom prst="rect">
+            <a:avLst/>
+          </a:prstGeom>
+          <a:ln w="19050">
+            <a:solidFill>
+              <a:srgbClr val="0070C0"/>
+            </a:solidFill>
+          </a:ln>
+          <a:effectLst/>
+        </p:spPr>
+        <p:style>
+          <a:lnRef idx="1">
+            <a:schemeClr val="accent1"/>
+          </a:lnRef>
+          <a:fillRef idx="2">
+            <a:schemeClr val="accent1"/>
+          </a:fillRef>
+          <a:effectRef idx="1">
+            <a:schemeClr val="accent1"/>
+          </a:effectRef>
+          <a:fontRef idx="minor">
+            <a:schemeClr val="dk1"/>
+          </a:fontRef>
+        </p:style>
+        <p:txBody>
+          <a:bodyPr rtlCol="0" anchor="ctr"/>
+          <a:lstStyle/>
+          <a:p>
+            <a:pPr algn="ctr"/>
+            <a:r>
+              <a:rPr lang="en-US" sz="1050" b="1" dirty="0" err="1">
+                <a:solidFill>
+                  <a:srgbClr val="0070C0"/>
+                </a:solidFill>
+              </a:rPr>
+              <a:t>AddEventCommand</a:t>
+            </a:r>
+            <a:endParaRPr lang="en-US" sz="1050" b="1" dirty="0">
+              <a:solidFill>
+                <a:srgbClr val="0070C0"/>
+              </a:solidFill>
+            </a:endParaRPr>
+          </a:p>
+        </p:txBody>
+      </p:sp>
+      <p:cxnSp>
+        <p:nvCxnSpPr>
+          <p:cNvPr id="37" name="Elbow Connector 133">
+            <a:extLst>
+              <a:ext uri="{FF2B5EF4-FFF2-40B4-BE49-F238E27FC236}">
+                <a16:creationId xmlns:a16="http://schemas.microsoft.com/office/drawing/2014/main" id="{C09865B3-E5EA-495A-B0C1-26F865A0235D}"/>
+              </a:ext>
+            </a:extLst>
+          </p:cNvPr>
+          <p:cNvCxnSpPr>
+            <a:cxnSpLocks/>
+          </p:cNvCxnSpPr>
+          <p:nvPr/>
+        </p:nvCxnSpPr>
+        <p:spPr>
+          <a:xfrm flipV="1">
+            <a:off x="6024820" y="2638706"/>
+            <a:ext cx="555483" cy="130723"/>
+          </a:xfrm>
+          <a:prstGeom prst="bentConnector3">
+            <a:avLst>
+              <a:gd name="adj1" fmla="val 50000"/>
+            </a:avLst>
+          </a:prstGeom>
+          <a:ln w="19050">
+            <a:headEnd type="none" w="med" len="med"/>
+            <a:tailEnd type="none" w="med" len="med"/>
+          </a:ln>
+        </p:spPr>
+        <p:style>
+          <a:lnRef idx="1">
+            <a:schemeClr val="accent1"/>
+          </a:lnRef>
+          <a:fillRef idx="0">
+            <a:schemeClr val="accent1"/>
+          </a:fillRef>
+          <a:effectRef idx="0">
+            <a:schemeClr val="accent1"/>
+          </a:effectRef>
+          <a:fontRef idx="minor">
+            <a:schemeClr val="tx1"/>
+          </a:fontRef>
+        </p:style>
+      </p:cxnSp>
     </p:spTree>
     <p:extLst>
       <p:ext uri="{BB962C8B-B14F-4D97-AF65-F5344CB8AC3E}">

</xml_diff>